<commit_message>
Small changes + ppsx
</commit_message>
<xml_diff>
--- a/brunova.pptx
+++ b/brunova.pptx
@@ -360,7 +360,7 @@
             <a:pPr indent="0" algn="r">
               <a:buNone/>
             </a:pPr>
-            <a:fld id="{DE14BD69-5A82-4DDE-86B5-E05FA671C9CA}" type="slidenum">
+            <a:fld id="{93C5A487-54A1-4FDC-A2CB-5B4146D84760}" type="slidenum">
               <a:rPr b="0" lang="cs-CZ" sz="1400" spc="-1" strike="noStrike">
                 <a:solidFill>
                   <a:srgbClr val="000000"/>
@@ -414,7 +414,7 @@
         <p:spPr>
           <a:xfrm>
             <a:off x="216360" y="812520"/>
-            <a:ext cx="7126560" cy="4008600"/>
+            <a:ext cx="7126200" cy="4008240"/>
           </a:xfrm>
           <a:prstGeom prst="rect">
             <a:avLst/>
@@ -437,7 +437,7 @@
         <p:spPr>
           <a:xfrm>
             <a:off x="756000" y="5078520"/>
-            <a:ext cx="6047280" cy="4810680"/>
+            <a:ext cx="6046920" cy="4810320"/>
           </a:xfrm>
           <a:prstGeom prst="rect">
             <a:avLst/>
@@ -457,6 +457,9 @@
                 <a:spcPct val="100000"/>
               </a:lnSpc>
               <a:buNone/>
+              <a:tabLst>
+                <a:tab algn="l" pos="0"/>
+              </a:tabLst>
             </a:pPr>
             <a:r>
               <a:rPr b="0" lang="cs-CZ" sz="2000" spc="-1" strike="noStrike">
@@ -480,6 +483,9 @@
                 <a:spcPct val="100000"/>
               </a:lnSpc>
               <a:buNone/>
+              <a:tabLst>
+                <a:tab algn="l" pos="0"/>
+              </a:tabLst>
             </a:pPr>
             <a:endParaRPr b="0" lang="cs-CZ" sz="2000" spc="-1" strike="noStrike">
               <a:solidFill>
@@ -494,6 +500,9 @@
                 <a:spcPct val="100000"/>
               </a:lnSpc>
               <a:buNone/>
+              <a:tabLst>
+                <a:tab algn="l" pos="0"/>
+              </a:tabLst>
             </a:pPr>
             <a:r>
               <a:rPr b="0" lang="cs-CZ" sz="2000" spc="-1" strike="noStrike">
@@ -517,6 +526,9 @@
                 <a:spcPct val="100000"/>
               </a:lnSpc>
               <a:buNone/>
+              <a:tabLst>
+                <a:tab algn="l" pos="0"/>
+              </a:tabLst>
             </a:pPr>
             <a:r>
               <a:rPr b="0" lang="cs-CZ" sz="2000" spc="-1" strike="noStrike">
@@ -540,6 +552,9 @@
                 <a:spcPct val="100000"/>
               </a:lnSpc>
               <a:buNone/>
+              <a:tabLst>
+                <a:tab algn="l" pos="0"/>
+              </a:tabLst>
             </a:pPr>
             <a:r>
               <a:rPr b="0" lang="cs-CZ" sz="2000" spc="-1" strike="noStrike">
@@ -563,6 +578,9 @@
                 <a:spcPct val="100000"/>
               </a:lnSpc>
               <a:buNone/>
+              <a:tabLst>
+                <a:tab algn="l" pos="0"/>
+              </a:tabLst>
             </a:pPr>
             <a:r>
               <a:rPr b="0" lang="cs-CZ" sz="2000" spc="-1" strike="noStrike">
@@ -586,6 +604,9 @@
                 <a:spcPct val="100000"/>
               </a:lnSpc>
               <a:buNone/>
+              <a:tabLst>
+                <a:tab algn="l" pos="0"/>
+              </a:tabLst>
             </a:pPr>
             <a:endParaRPr b="0" lang="cs-CZ" sz="2000" spc="-1" strike="noStrike">
               <a:solidFill>
@@ -600,6 +621,9 @@
                 <a:spcPct val="100000"/>
               </a:lnSpc>
               <a:buNone/>
+              <a:tabLst>
+                <a:tab algn="l" pos="0"/>
+              </a:tabLst>
             </a:pPr>
             <a:r>
               <a:rPr b="0" lang="cs-CZ" sz="2000" spc="-1" strike="noStrike">
@@ -654,7 +678,7 @@
         <p:spPr>
           <a:xfrm>
             <a:off x="216360" y="812520"/>
-            <a:ext cx="7126560" cy="4008600"/>
+            <a:ext cx="7126200" cy="4008240"/>
           </a:xfrm>
           <a:prstGeom prst="rect">
             <a:avLst/>
@@ -677,7 +701,7 @@
         <p:spPr>
           <a:xfrm>
             <a:off x="756000" y="5078520"/>
-            <a:ext cx="6047280" cy="4810680"/>
+            <a:ext cx="6046920" cy="4810320"/>
           </a:xfrm>
           <a:prstGeom prst="rect">
             <a:avLst/>
@@ -697,6 +721,9 @@
                 <a:spcPct val="100000"/>
               </a:lnSpc>
               <a:buNone/>
+              <a:tabLst>
+                <a:tab algn="l" pos="0"/>
+              </a:tabLst>
             </a:pPr>
             <a:r>
               <a:rPr b="0" lang="cs-CZ" sz="2000" spc="-1" strike="noStrike">
@@ -720,6 +747,9 @@
                 <a:spcPct val="100000"/>
               </a:lnSpc>
               <a:buNone/>
+              <a:tabLst>
+                <a:tab algn="l" pos="0"/>
+              </a:tabLst>
             </a:pPr>
             <a:r>
               <a:rPr b="0" lang="cs-CZ" sz="2000" spc="-1" strike="noStrike">
@@ -752,6 +782,9 @@
                 <a:spcPct val="100000"/>
               </a:lnSpc>
               <a:buNone/>
+              <a:tabLst>
+                <a:tab algn="l" pos="0"/>
+              </a:tabLst>
             </a:pPr>
             <a:r>
               <a:rPr b="0" lang="cs-CZ" sz="2000" spc="-1" strike="noStrike">
@@ -815,7 +848,7 @@
         <p:spPr>
           <a:xfrm>
             <a:off x="216360" y="812520"/>
-            <a:ext cx="7126560" cy="4008600"/>
+            <a:ext cx="7126200" cy="4008240"/>
           </a:xfrm>
           <a:prstGeom prst="rect">
             <a:avLst/>
@@ -838,7 +871,7 @@
         <p:spPr>
           <a:xfrm>
             <a:off x="720000" y="5220000"/>
-            <a:ext cx="6047280" cy="4810680"/>
+            <a:ext cx="6046920" cy="4810320"/>
           </a:xfrm>
           <a:prstGeom prst="rect">
             <a:avLst/>
@@ -858,6 +891,9 @@
                 <a:spcPct val="100000"/>
               </a:lnSpc>
               <a:buNone/>
+              <a:tabLst>
+                <a:tab algn="l" pos="0"/>
+              </a:tabLst>
             </a:pPr>
             <a:r>
               <a:rPr b="0" lang="cs-CZ" sz="2000" spc="-1" strike="noStrike">
@@ -890,6 +926,9 @@
                 <a:spcPct val="100000"/>
               </a:lnSpc>
               <a:buNone/>
+              <a:tabLst>
+                <a:tab algn="l" pos="0"/>
+              </a:tabLst>
             </a:pPr>
             <a:endParaRPr b="0" lang="cs-CZ" sz="2000" spc="-1" strike="noStrike">
               <a:solidFill>
@@ -904,6 +943,9 @@
                 <a:spcPct val="100000"/>
               </a:lnSpc>
               <a:buNone/>
+              <a:tabLst>
+                <a:tab algn="l" pos="0"/>
+              </a:tabLst>
             </a:pPr>
             <a:r>
               <a:rPr b="0" lang="cs-CZ" sz="2000" spc="-1" strike="noStrike">
@@ -958,7 +1000,7 @@
         <p:spPr>
           <a:xfrm>
             <a:off x="216360" y="812520"/>
-            <a:ext cx="7126560" cy="4008600"/>
+            <a:ext cx="7126200" cy="4008240"/>
           </a:xfrm>
           <a:prstGeom prst="rect">
             <a:avLst/>
@@ -981,7 +1023,7 @@
         <p:spPr>
           <a:xfrm>
             <a:off x="756000" y="5078520"/>
-            <a:ext cx="6047280" cy="4810680"/>
+            <a:ext cx="6046920" cy="4810320"/>
           </a:xfrm>
           <a:prstGeom prst="rect">
             <a:avLst/>
@@ -1110,7 +1152,7 @@
         <p:spPr>
           <a:xfrm>
             <a:off x="216000" y="812520"/>
-            <a:ext cx="7126920" cy="4008600"/>
+            <a:ext cx="7126560" cy="4008240"/>
           </a:xfrm>
           <a:prstGeom prst="rect">
             <a:avLst/>
@@ -1133,7 +1175,7 @@
         <p:spPr>
           <a:xfrm>
             <a:off x="756000" y="5078520"/>
-            <a:ext cx="6047280" cy="4810680"/>
+            <a:ext cx="6046920" cy="4810320"/>
           </a:xfrm>
           <a:prstGeom prst="rect">
             <a:avLst/>
@@ -1153,6 +1195,9 @@
                 <a:spcPct val="100000"/>
               </a:lnSpc>
               <a:buNone/>
+              <a:tabLst>
+                <a:tab algn="l" pos="0"/>
+              </a:tabLst>
             </a:pPr>
             <a:r>
               <a:rPr b="0" lang="cs-CZ" sz="2000" spc="-1" strike="noStrike">
@@ -1185,6 +1230,9 @@
                 <a:spcPct val="100000"/>
               </a:lnSpc>
               <a:buNone/>
+              <a:tabLst>
+                <a:tab algn="l" pos="0"/>
+              </a:tabLst>
             </a:pPr>
             <a:endParaRPr b="0" lang="cs-CZ" sz="2000" spc="-1" strike="noStrike">
               <a:solidFill>
@@ -1199,6 +1247,9 @@
                 <a:spcPct val="100000"/>
               </a:lnSpc>
               <a:buNone/>
+              <a:tabLst>
+                <a:tab algn="l" pos="0"/>
+              </a:tabLst>
             </a:pPr>
             <a:r>
               <a:rPr b="0" lang="cs-CZ" sz="2000" spc="-1" strike="noStrike">
@@ -1222,6 +1273,9 @@
                 <a:spcPct val="100000"/>
               </a:lnSpc>
               <a:buNone/>
+              <a:tabLst>
+                <a:tab algn="l" pos="0"/>
+              </a:tabLst>
             </a:pPr>
             <a:r>
               <a:rPr b="0" lang="cs-CZ" sz="2000" spc="-1" strike="noStrike">
@@ -1245,6 +1299,9 @@
                 <a:spcPct val="100000"/>
               </a:lnSpc>
               <a:buNone/>
+              <a:tabLst>
+                <a:tab algn="l" pos="0"/>
+              </a:tabLst>
             </a:pPr>
             <a:r>
               <a:rPr b="0" lang="cs-CZ" sz="2000" spc="-1" strike="noStrike">
@@ -1268,6 +1325,9 @@
                 <a:spcPct val="100000"/>
               </a:lnSpc>
               <a:buNone/>
+              <a:tabLst>
+                <a:tab algn="l" pos="0"/>
+              </a:tabLst>
             </a:pPr>
             <a:r>
               <a:rPr b="0" lang="cs-CZ" sz="2000" spc="-1" strike="noStrike">
@@ -1291,6 +1351,9 @@
                 <a:spcPct val="100000"/>
               </a:lnSpc>
               <a:buNone/>
+              <a:tabLst>
+                <a:tab algn="l" pos="0"/>
+              </a:tabLst>
             </a:pPr>
             <a:r>
               <a:rPr b="0" lang="cs-CZ" sz="2000" spc="-1" strike="noStrike">
@@ -1314,6 +1377,9 @@
                 <a:spcPct val="100000"/>
               </a:lnSpc>
               <a:buNone/>
+              <a:tabLst>
+                <a:tab algn="l" pos="0"/>
+              </a:tabLst>
             </a:pPr>
             <a:endParaRPr b="0" lang="cs-CZ" sz="2000" spc="-1" strike="noStrike">
               <a:solidFill>
@@ -1328,6 +1394,9 @@
                 <a:spcPct val="100000"/>
               </a:lnSpc>
               <a:buNone/>
+              <a:tabLst>
+                <a:tab algn="l" pos="0"/>
+              </a:tabLst>
             </a:pPr>
             <a:r>
               <a:rPr b="0" lang="cs-CZ" sz="2000" spc="-1" strike="noStrike">
@@ -4926,7 +4995,7 @@
         <p:spPr>
           <a:xfrm>
             <a:off x="0" y="3780000"/>
-            <a:ext cx="10077480" cy="1887480"/>
+            <a:ext cx="10077120" cy="1887120"/>
           </a:xfrm>
           <a:prstGeom prst="rect">
             <a:avLst/>
@@ -4959,11 +5028,17 @@
             <a:noAutofit/>
           </a:bodyPr>
           <a:p>
+            <a:pPr>
+              <a:lnSpc>
+                <a:spcPct val="100000"/>
+              </a:lnSpc>
+            </a:pPr>
             <a:endParaRPr b="0" lang="cs-CZ" sz="1800" spc="-1" strike="noStrike">
               <a:solidFill>
                 <a:srgbClr val="000000"/>
               </a:solidFill>
               <a:latin typeface="Arial"/>
+              <a:ea typeface="DejaVu Sans"/>
             </a:endParaRPr>
           </a:p>
         </p:txBody>
@@ -5296,7 +5371,7 @@
         <p:spPr>
           <a:xfrm flipV="1">
             <a:off x="0" y="-2880"/>
-            <a:ext cx="10077480" cy="1077480"/>
+            <a:ext cx="10077120" cy="1077120"/>
           </a:xfrm>
           <a:prstGeom prst="rect">
             <a:avLst/>
@@ -5329,11 +5404,17 @@
             <a:noAutofit/>
           </a:bodyPr>
           <a:p>
+            <a:pPr>
+              <a:lnSpc>
+                <a:spcPct val="100000"/>
+              </a:lnSpc>
+            </a:pPr>
             <a:endParaRPr b="0" lang="cs-CZ" sz="1800" spc="-1" strike="noStrike">
               <a:solidFill>
                 <a:srgbClr val="000000"/>
               </a:solidFill>
               <a:latin typeface="Arial"/>
+              <a:ea typeface="DejaVu Sans"/>
             </a:endParaRPr>
           </a:p>
         </p:txBody>
@@ -5670,7 +5751,7 @@
         <p:spPr>
           <a:xfrm>
             <a:off x="450000" y="270000"/>
-            <a:ext cx="8997480" cy="3237480"/>
+            <a:ext cx="8997120" cy="3237120"/>
           </a:xfrm>
           <a:prstGeom prst="rect">
             <a:avLst/>
@@ -5725,7 +5806,7 @@
         <p:spPr>
           <a:xfrm>
             <a:off x="450000" y="3870000"/>
-            <a:ext cx="8997480" cy="1167480"/>
+            <a:ext cx="8997120" cy="1167120"/>
           </a:xfrm>
           <a:prstGeom prst="rect">
             <a:avLst/>
@@ -5756,7 +5837,7 @@
                 </a:solidFill>
                 <a:latin typeface="Source Sans Pro"/>
               </a:rPr>
-              <a:t>Autor</a:t>
+              <a:t>Tereza Brůnová</a:t>
             </a:r>
             <a:endParaRPr b="0" lang="cs-CZ" sz="2700" spc="-1" strike="noStrike">
               <a:solidFill>
@@ -5818,7 +5899,7 @@
         <p:spPr>
           <a:xfrm>
             <a:off x="502920" y="90720"/>
-            <a:ext cx="9069120" cy="944280"/>
+            <a:ext cx="9068760" cy="943920"/>
           </a:xfrm>
           <a:prstGeom prst="rect">
             <a:avLst/>
@@ -5869,7 +5950,7 @@
         <p:spPr>
           <a:xfrm>
             <a:off x="540000" y="1497960"/>
-            <a:ext cx="6119280" cy="301320"/>
+            <a:ext cx="6118920" cy="300960"/>
           </a:xfrm>
           <a:prstGeom prst="rect">
             <a:avLst/>
@@ -5925,7 +6006,7 @@
         <p:spPr>
           <a:xfrm>
             <a:off x="532800" y="1992600"/>
-            <a:ext cx="6126480" cy="1791720"/>
+            <a:ext cx="6126120" cy="1791360"/>
           </a:xfrm>
           <a:prstGeom prst="rect">
             <a:avLst/>
@@ -6224,7 +6305,7 @@
         <p:spPr>
           <a:xfrm>
             <a:off x="540000" y="3960000"/>
-            <a:ext cx="6119280" cy="1359720"/>
+            <a:ext cx="6118920" cy="1359360"/>
           </a:xfrm>
           <a:prstGeom prst="rect">
             <a:avLst/>
@@ -6477,7 +6558,7 @@
         <p:spPr>
           <a:xfrm>
             <a:off x="502920" y="90720"/>
-            <a:ext cx="9069120" cy="944280"/>
+            <a:ext cx="9068760" cy="943920"/>
           </a:xfrm>
           <a:prstGeom prst="rect">
             <a:avLst/>
@@ -7100,7 +7181,7 @@
         <p:spPr>
           <a:xfrm>
             <a:off x="540000" y="1260000"/>
-            <a:ext cx="8999280" cy="1331640"/>
+            <a:ext cx="8998920" cy="1331280"/>
           </a:xfrm>
           <a:prstGeom prst="rect">
             <a:avLst/>
@@ -7224,7 +7305,7 @@
         <p:spPr>
           <a:xfrm>
             <a:off x="450000" y="270000"/>
-            <a:ext cx="8997480" cy="3237480"/>
+            <a:ext cx="8997120" cy="3237120"/>
           </a:xfrm>
           <a:prstGeom prst="rect">
             <a:avLst/>
@@ -7317,7 +7398,7 @@
         <p:spPr>
           <a:xfrm>
             <a:off x="502920" y="90720"/>
-            <a:ext cx="9069120" cy="944280"/>
+            <a:ext cx="9068760" cy="943920"/>
           </a:xfrm>
           <a:prstGeom prst="rect">
             <a:avLst/>
@@ -7372,7 +7453,7 @@
         <p:spPr>
           <a:xfrm>
             <a:off x="360000" y="1440000"/>
-            <a:ext cx="9019440" cy="3597480"/>
+            <a:ext cx="9019080" cy="3597120"/>
           </a:xfrm>
           <a:prstGeom prst="rect">
             <a:avLst/>
@@ -7387,7 +7468,7 @@
             <a:normAutofit fontScale="88000"/>
           </a:bodyPr>
           <a:p>
-            <a:pPr marL="431640" indent="-323640">
+            <a:pPr marL="431280" indent="-323280">
               <a:lnSpc>
                 <a:spcPct val="100000"/>
               </a:lnSpc>
@@ -7418,7 +7499,7 @@
             </a:endParaRPr>
           </a:p>
           <a:p>
-            <a:pPr marL="431640" indent="-323640">
+            <a:pPr marL="431280" indent="-323280">
               <a:lnSpc>
                 <a:spcPct val="100000"/>
               </a:lnSpc>
@@ -7449,7 +7530,7 @@
             </a:endParaRPr>
           </a:p>
           <a:p>
-            <a:pPr marL="431640" indent="-323640">
+            <a:pPr marL="431280" indent="-323280">
               <a:lnSpc>
                 <a:spcPct val="100000"/>
               </a:lnSpc>
@@ -7480,7 +7561,7 @@
             </a:endParaRPr>
           </a:p>
           <a:p>
-            <a:pPr marL="431640" indent="-323640">
+            <a:pPr marL="431280" indent="-323280">
               <a:lnSpc>
                 <a:spcPct val="100000"/>
               </a:lnSpc>
@@ -7511,7 +7592,7 @@
             </a:endParaRPr>
           </a:p>
           <a:p>
-            <a:pPr lvl="1" marL="863640" indent="-323640">
+            <a:pPr lvl="1" marL="863280" indent="-323280">
               <a:lnSpc>
                 <a:spcPct val="100000"/>
               </a:lnSpc>
@@ -7542,7 +7623,7 @@
             </a:endParaRPr>
           </a:p>
           <a:p>
-            <a:pPr lvl="1" marL="863640" indent="-323640">
+            <a:pPr lvl="1" marL="863280" indent="-323280">
               <a:lnSpc>
                 <a:spcPct val="100000"/>
               </a:lnSpc>
@@ -7573,7 +7654,7 @@
             </a:endParaRPr>
           </a:p>
           <a:p>
-            <a:pPr lvl="1" marL="863640" indent="-323640">
+            <a:pPr lvl="1" marL="863280" indent="-323280">
               <a:lnSpc>
                 <a:spcPct val="100000"/>
               </a:lnSpc>
@@ -7604,7 +7685,7 @@
             </a:endParaRPr>
           </a:p>
           <a:p>
-            <a:pPr lvl="1" marL="863640" indent="-323640">
+            <a:pPr lvl="1" marL="863280" indent="-323280">
               <a:lnSpc>
                 <a:spcPct val="100000"/>
               </a:lnSpc>
@@ -7635,7 +7716,7 @@
             </a:endParaRPr>
           </a:p>
           <a:p>
-            <a:pPr lvl="1" marL="863640" indent="-323640">
+            <a:pPr lvl="1" marL="863280" indent="-323280">
               <a:lnSpc>
                 <a:spcPct val="100000"/>
               </a:lnSpc>
@@ -7718,7 +7799,7 @@
         <p:spPr>
           <a:xfrm>
             <a:off x="450000" y="270000"/>
-            <a:ext cx="8997480" cy="3237480"/>
+            <a:ext cx="8997120" cy="3237120"/>
           </a:xfrm>
           <a:prstGeom prst="rect">
             <a:avLst/>
@@ -7811,7 +7892,7 @@
         <p:spPr>
           <a:xfrm>
             <a:off x="502920" y="90720"/>
-            <a:ext cx="9069120" cy="944280"/>
+            <a:ext cx="9068760" cy="943920"/>
           </a:xfrm>
           <a:prstGeom prst="rect">
             <a:avLst/>
@@ -7866,7 +7947,7 @@
         <p:spPr>
           <a:xfrm>
             <a:off x="360000" y="1440000"/>
-            <a:ext cx="9019440" cy="3597480"/>
+            <a:ext cx="9019080" cy="3597120"/>
           </a:xfrm>
           <a:prstGeom prst="rect">
             <a:avLst/>
@@ -7982,6 +8063,9 @@
                 <a:spcPts val="1054"/>
               </a:spcAft>
               <a:buNone/>
+              <a:tabLst>
+                <a:tab algn="l" pos="0"/>
+              </a:tabLst>
             </a:pPr>
             <a:endParaRPr b="0" lang="cs-CZ" sz="2400" spc="-1" strike="noStrike">
               <a:solidFill>
@@ -8004,6 +8088,9 @@
               <a:buSzPct val="45000"/>
               <a:buFont typeface="Wingdings" charset="2"/>
               <a:buChar char=""/>
+              <a:tabLst>
+                <a:tab algn="l" pos="0"/>
+              </a:tabLst>
             </a:pPr>
             <a:r>
               <a:rPr b="0" lang="cs-CZ" sz="1800" spc="-1" strike="noStrike">
@@ -8101,7 +8188,7 @@
         <p:spPr>
           <a:xfrm>
             <a:off x="502920" y="90720"/>
-            <a:ext cx="9069120" cy="944280"/>
+            <a:ext cx="9068760" cy="943920"/>
           </a:xfrm>
           <a:prstGeom prst="rect">
             <a:avLst/>
@@ -8156,7 +8243,7 @@
         <p:spPr>
           <a:xfrm>
             <a:off x="360000" y="1440000"/>
-            <a:ext cx="9019440" cy="3597480"/>
+            <a:ext cx="9019080" cy="3597120"/>
           </a:xfrm>
           <a:prstGeom prst="rect">
             <a:avLst/>
@@ -8171,7 +8258,7 @@
             <a:normAutofit fontScale="94000"/>
           </a:bodyPr>
           <a:p>
-            <a:pPr marL="431640" indent="-323640">
+            <a:pPr marL="431280" indent="-323280">
               <a:lnSpc>
                 <a:spcPct val="100000"/>
               </a:lnSpc>
@@ -8210,6 +8297,9 @@
                 <a:spcPts val="1054"/>
               </a:spcAft>
               <a:buNone/>
+              <a:tabLst>
+                <a:tab algn="l" pos="0"/>
+              </a:tabLst>
             </a:pPr>
             <a:endParaRPr b="0" lang="cs-CZ" sz="2400" spc="-1" strike="noStrike">
               <a:solidFill>
@@ -8219,7 +8309,7 @@
             </a:endParaRPr>
           </a:p>
           <a:p>
-            <a:pPr marL="431640" indent="-323640">
+            <a:pPr marL="431280" indent="-323280">
               <a:lnSpc>
                 <a:spcPct val="100000"/>
               </a:lnSpc>
@@ -8232,6 +8322,9 @@
               <a:buSzPct val="45000"/>
               <a:buFont typeface="Wingdings" charset="2"/>
               <a:buChar char=""/>
+              <a:tabLst>
+                <a:tab algn="l" pos="0"/>
+              </a:tabLst>
             </a:pPr>
             <a:r>
               <a:rPr b="0" lang="cs-CZ" sz="1800" spc="-1" strike="noStrike">
@@ -8267,6 +8360,9 @@
                 <a:spcPts val="1054"/>
               </a:spcAft>
               <a:buNone/>
+              <a:tabLst>
+                <a:tab algn="l" pos="0"/>
+              </a:tabLst>
             </a:pPr>
             <a:endParaRPr b="0" lang="cs-CZ" sz="1800" spc="-1" strike="noStrike">
               <a:solidFill>
@@ -8276,7 +8372,7 @@
             </a:endParaRPr>
           </a:p>
           <a:p>
-            <a:pPr marL="431640" indent="-323640">
+            <a:pPr marL="431280" indent="-323280">
               <a:lnSpc>
                 <a:spcPct val="100000"/>
               </a:lnSpc>
@@ -8289,6 +8385,9 @@
               <a:buSzPct val="45000"/>
               <a:buFont typeface="Wingdings" charset="2"/>
               <a:buChar char=""/>
+              <a:tabLst>
+                <a:tab algn="l" pos="0"/>
+              </a:tabLst>
             </a:pPr>
             <a:r>
               <a:rPr b="0" lang="cs-CZ" sz="2400" spc="-1" strike="noStrike">
@@ -8315,6 +8414,9 @@
                 <a:spcPts val="1054"/>
               </a:spcAft>
               <a:buNone/>
+              <a:tabLst>
+                <a:tab algn="l" pos="0"/>
+              </a:tabLst>
             </a:pPr>
             <a:endParaRPr b="0" lang="cs-CZ" sz="2400" spc="-1" strike="noStrike">
               <a:solidFill>
@@ -8324,7 +8426,7 @@
             </a:endParaRPr>
           </a:p>
           <a:p>
-            <a:pPr marL="431640" indent="-323640">
+            <a:pPr marL="431280" indent="-323280">
               <a:lnSpc>
                 <a:spcPct val="100000"/>
               </a:lnSpc>
@@ -8337,6 +8439,9 @@
               <a:buSzPct val="45000"/>
               <a:buFont typeface="Wingdings" charset="2"/>
               <a:buChar char=""/>
+              <a:tabLst>
+                <a:tab algn="l" pos="0"/>
+              </a:tabLst>
             </a:pPr>
             <a:r>
               <a:rPr b="0" i="1" lang="cs-CZ" sz="1800" spc="-1" strike="noStrike">
@@ -8416,7 +8521,7 @@
         <p:spPr>
           <a:xfrm>
             <a:off x="502920" y="90720"/>
-            <a:ext cx="9069120" cy="944280"/>
+            <a:ext cx="9068760" cy="943920"/>
           </a:xfrm>
           <a:prstGeom prst="rect">
             <a:avLst/>
@@ -8471,7 +8576,7 @@
         <p:spPr>
           <a:xfrm>
             <a:off x="360000" y="1440000"/>
-            <a:ext cx="9019440" cy="3597480"/>
+            <a:ext cx="9019080" cy="3597120"/>
           </a:xfrm>
           <a:prstGeom prst="rect">
             <a:avLst/>
@@ -8525,6 +8630,9 @@
                 <a:spcPts val="1054"/>
               </a:spcAft>
               <a:buNone/>
+              <a:tabLst>
+                <a:tab algn="l" pos="0"/>
+              </a:tabLst>
             </a:pPr>
             <a:endParaRPr b="0" lang="cs-CZ" sz="2400" spc="-1" strike="noStrike">
               <a:solidFill>
@@ -8547,6 +8655,9 @@
               <a:buSzPct val="45000"/>
               <a:buFont typeface="Wingdings" charset="2"/>
               <a:buChar char=""/>
+              <a:tabLst>
+                <a:tab algn="l" pos="0"/>
+              </a:tabLst>
             </a:pPr>
             <a:r>
               <a:rPr b="0" lang="cs-CZ" sz="1800" spc="-1" strike="noStrike">
@@ -8600,6 +8711,9 @@
                 <a:spcPts val="1054"/>
               </a:spcAft>
               <a:buNone/>
+              <a:tabLst>
+                <a:tab algn="l" pos="0"/>
+              </a:tabLst>
             </a:pPr>
             <a:endParaRPr b="0" lang="cs-CZ" sz="1800" spc="-1" strike="noStrike">
               <a:solidFill>
@@ -8622,6 +8736,9 @@
               <a:buSzPct val="45000"/>
               <a:buFont typeface="Wingdings" charset="2"/>
               <a:buChar char=""/>
+              <a:tabLst>
+                <a:tab algn="l" pos="0"/>
+              </a:tabLst>
             </a:pPr>
             <a:r>
               <a:rPr b="0" lang="cs-CZ" sz="2400" spc="-1" strike="noStrike">
@@ -8692,7 +8809,7 @@
         <p:spPr>
           <a:xfrm>
             <a:off x="502920" y="90720"/>
-            <a:ext cx="9069120" cy="944280"/>
+            <a:ext cx="9068760" cy="943920"/>
           </a:xfrm>
           <a:prstGeom prst="rect">
             <a:avLst/>
@@ -8747,7 +8864,7 @@
         <p:spPr>
           <a:xfrm>
             <a:off x="360000" y="1440000"/>
-            <a:ext cx="9019440" cy="3597480"/>
+            <a:ext cx="9019080" cy="3597120"/>
           </a:xfrm>
           <a:prstGeom prst="rect">
             <a:avLst/>
@@ -8801,6 +8918,9 @@
                 <a:spcPts val="1054"/>
               </a:spcAft>
               <a:buNone/>
+              <a:tabLst>
+                <a:tab algn="l" pos="0"/>
+              </a:tabLst>
             </a:pPr>
             <a:endParaRPr b="0" lang="cs-CZ" sz="2400" spc="-1" strike="noStrike">
               <a:solidFill>
@@ -8823,6 +8943,9 @@
               <a:buSzPct val="45000"/>
               <a:buFont typeface="Wingdings" charset="2"/>
               <a:buChar char=""/>
+              <a:tabLst>
+                <a:tab algn="l" pos="0"/>
+              </a:tabLst>
             </a:pPr>
             <a:r>
               <a:rPr b="0" lang="cs-CZ" sz="2400" spc="-1" strike="noStrike">
@@ -8849,6 +8972,9 @@
                 <a:spcPts val="1054"/>
               </a:spcAft>
               <a:buNone/>
+              <a:tabLst>
+                <a:tab algn="l" pos="0"/>
+              </a:tabLst>
             </a:pPr>
             <a:endParaRPr b="0" lang="cs-CZ" sz="2400" spc="-1" strike="noStrike">
               <a:solidFill>
@@ -8871,6 +8997,9 @@
               <a:buSzPct val="45000"/>
               <a:buFont typeface="Wingdings" charset="2"/>
               <a:buChar char=""/>
+              <a:tabLst>
+                <a:tab algn="l" pos="0"/>
+              </a:tabLst>
             </a:pPr>
             <a:r>
               <a:rPr b="0" lang="cs-CZ" sz="1500" spc="-1" strike="noStrike">
@@ -8929,6 +9058,9 @@
               <a:buSzPct val="45000"/>
               <a:buFont typeface="Wingdings" charset="2"/>
               <a:buChar char=""/>
+              <a:tabLst>
+                <a:tab algn="l" pos="0"/>
+              </a:tabLst>
             </a:pPr>
             <a:r>
               <a:rPr b="0" lang="cs-CZ" sz="1500" spc="-1" strike="noStrike">
@@ -9026,7 +9158,7 @@
         <p:spPr>
           <a:xfrm>
             <a:off x="450000" y="270000"/>
-            <a:ext cx="8997480" cy="3237480"/>
+            <a:ext cx="8997120" cy="3237120"/>
           </a:xfrm>
           <a:prstGeom prst="rect">
             <a:avLst/>
@@ -9081,7 +9213,7 @@
         <p:spPr>
           <a:xfrm>
             <a:off x="6120000" y="1980000"/>
-            <a:ext cx="2879280" cy="2879280"/>
+            <a:ext cx="2878920" cy="2878920"/>
           </a:xfrm>
           <a:prstGeom prst="rect">
             <a:avLst/>
@@ -9142,7 +9274,7 @@
         <p:spPr>
           <a:xfrm>
             <a:off x="450000" y="270000"/>
-            <a:ext cx="8997480" cy="3237480"/>
+            <a:ext cx="8997120" cy="3237120"/>
           </a:xfrm>
           <a:prstGeom prst="rect">
             <a:avLst/>
@@ -9235,7 +9367,7 @@
         <p:spPr>
           <a:xfrm>
             <a:off x="502920" y="90720"/>
-            <a:ext cx="9069120" cy="944280"/>
+            <a:ext cx="9068760" cy="943920"/>
           </a:xfrm>
           <a:prstGeom prst="rect">
             <a:avLst/>
@@ -9290,7 +9422,7 @@
         <p:spPr>
           <a:xfrm>
             <a:off x="360000" y="1440000"/>
-            <a:ext cx="9019440" cy="3597480"/>
+            <a:ext cx="9019080" cy="3597120"/>
           </a:xfrm>
           <a:prstGeom prst="rect">
             <a:avLst/>
@@ -9305,7 +9437,7 @@
             <a:normAutofit fontScale="98000"/>
           </a:bodyPr>
           <a:p>
-            <a:pPr marL="431640" indent="-323640">
+            <a:pPr marL="431280" indent="-323280">
               <a:lnSpc>
                 <a:spcPct val="100000"/>
               </a:lnSpc>
@@ -9347,7 +9479,7 @@
             </a:endParaRPr>
           </a:p>
           <a:p>
-            <a:pPr marL="431640" indent="-323640">
+            <a:pPr marL="431280" indent="-323280">
               <a:lnSpc>
                 <a:spcPct val="100000"/>
               </a:lnSpc>
@@ -9389,7 +9521,7 @@
             </a:endParaRPr>
           </a:p>
           <a:p>
-            <a:pPr marL="431640" indent="-323640">
+            <a:pPr marL="431280" indent="-323280">
               <a:lnSpc>
                 <a:spcPct val="100000"/>
               </a:lnSpc>
@@ -9431,7 +9563,7 @@
             </a:endParaRPr>
           </a:p>
           <a:p>
-            <a:pPr marL="431640" indent="-323640">
+            <a:pPr marL="431280" indent="-323280">
               <a:lnSpc>
                 <a:spcPct val="100000"/>
               </a:lnSpc>
@@ -9473,7 +9605,7 @@
             </a:endParaRPr>
           </a:p>
           <a:p>
-            <a:pPr marL="431640" indent="-323640">
+            <a:pPr marL="431280" indent="-323280">
               <a:lnSpc>
                 <a:spcPct val="100000"/>
               </a:lnSpc>
@@ -9515,7 +9647,7 @@
             </a:endParaRPr>
           </a:p>
           <a:p>
-            <a:pPr marL="431640" indent="-323640">
+            <a:pPr marL="431280" indent="-323280">
               <a:lnSpc>
                 <a:spcPct val="100000"/>
               </a:lnSpc>
@@ -9565,6 +9697,9 @@
                 <a:spcPts val="1417"/>
               </a:spcBef>
               <a:buNone/>
+              <a:tabLst>
+                <a:tab algn="l" pos="0"/>
+              </a:tabLst>
             </a:pPr>
             <a:endParaRPr b="0" lang="cs-CZ" sz="1500" spc="-1" strike="noStrike">
               <a:solidFill>
@@ -9626,7 +9761,7 @@
         <p:spPr>
           <a:xfrm>
             <a:off x="502920" y="90720"/>
-            <a:ext cx="9069120" cy="944280"/>
+            <a:ext cx="9068760" cy="943920"/>
           </a:xfrm>
           <a:prstGeom prst="rect">
             <a:avLst/>
@@ -9677,7 +9812,7 @@
         <p:spPr>
           <a:xfrm>
             <a:off x="837360" y="1620000"/>
-            <a:ext cx="2761920" cy="429480"/>
+            <a:ext cx="2761560" cy="429120"/>
           </a:xfrm>
           <a:prstGeom prst="rect">
             <a:avLst/>
@@ -9775,7 +9910,7 @@
         <p:spPr>
           <a:xfrm>
             <a:off x="502920" y="90720"/>
-            <a:ext cx="9069120" cy="944280"/>
+            <a:ext cx="9068760" cy="943920"/>
           </a:xfrm>
           <a:prstGeom prst="rect">
             <a:avLst/>
@@ -9830,7 +9965,7 @@
         <p:spPr>
           <a:xfrm>
             <a:off x="360000" y="1440000"/>
-            <a:ext cx="9019440" cy="3495240"/>
+            <a:ext cx="9019080" cy="3494880"/>
           </a:xfrm>
           <a:prstGeom prst="rect">
             <a:avLst/>
@@ -10052,7 +10187,7 @@
         <p:spPr>
           <a:xfrm>
             <a:off x="502920" y="90720"/>
-            <a:ext cx="9069120" cy="944280"/>
+            <a:ext cx="9068760" cy="943920"/>
           </a:xfrm>
           <a:prstGeom prst="rect">
             <a:avLst/>
@@ -10107,7 +10242,7 @@
         <p:spPr>
           <a:xfrm>
             <a:off x="360000" y="1440000"/>
-            <a:ext cx="9019440" cy="3597480"/>
+            <a:ext cx="9019080" cy="3597120"/>
           </a:xfrm>
           <a:prstGeom prst="rect">
             <a:avLst/>
@@ -10298,7 +10433,7 @@
         <p:spPr>
           <a:xfrm>
             <a:off x="502920" y="90720"/>
-            <a:ext cx="9069120" cy="944280"/>
+            <a:ext cx="9068760" cy="943920"/>
           </a:xfrm>
           <a:prstGeom prst="rect">
             <a:avLst/>
@@ -10353,7 +10488,7 @@
         <p:spPr>
           <a:xfrm>
             <a:off x="360000" y="1440000"/>
-            <a:ext cx="9019440" cy="3597480"/>
+            <a:ext cx="9019080" cy="3597120"/>
           </a:xfrm>
           <a:prstGeom prst="rect">
             <a:avLst/>
@@ -10575,7 +10710,7 @@
         <p:spPr>
           <a:xfrm>
             <a:off x="502920" y="90720"/>
-            <a:ext cx="9069120" cy="944280"/>
+            <a:ext cx="9068760" cy="943920"/>
           </a:xfrm>
           <a:prstGeom prst="rect">
             <a:avLst/>
@@ -10630,7 +10765,7 @@
         <p:spPr>
           <a:xfrm>
             <a:off x="360000" y="1440000"/>
-            <a:ext cx="9019440" cy="3597480"/>
+            <a:ext cx="9019080" cy="3597120"/>
           </a:xfrm>
           <a:prstGeom prst="rect">
             <a:avLst/>
@@ -11591,7 +11726,7 @@
         <p:spPr>
           <a:xfrm>
             <a:off x="502920" y="90720"/>
-            <a:ext cx="9069120" cy="944280"/>
+            <a:ext cx="9068760" cy="943920"/>
           </a:xfrm>
           <a:prstGeom prst="rect">
             <a:avLst/>
@@ -11642,7 +11777,7 @@
         <p:spPr>
           <a:xfrm>
             <a:off x="4680000" y="2340000"/>
-            <a:ext cx="4138200" cy="1798200"/>
+            <a:ext cx="4137840" cy="1797840"/>
           </a:xfrm>
           <a:prstGeom prst="rect">
             <a:avLst/>
@@ -11667,11 +11802,17 @@
             <a:noAutofit/>
           </a:bodyPr>
           <a:p>
+            <a:pPr>
+              <a:lnSpc>
+                <a:spcPct val="100000"/>
+              </a:lnSpc>
+            </a:pPr>
             <a:endParaRPr b="0" lang="cs-CZ" sz="1800" spc="-1" strike="noStrike">
               <a:solidFill>
                 <a:srgbClr val="000000"/>
               </a:solidFill>
               <a:latin typeface="Arial"/>
+              <a:ea typeface="DejaVu Sans"/>
             </a:endParaRPr>
           </a:p>
         </p:txBody>
@@ -11685,7 +11826,7 @@
         <p:spPr>
           <a:xfrm>
             <a:off x="4860000" y="2520000"/>
-            <a:ext cx="1798200" cy="1438200"/>
+            <a:ext cx="1797840" cy="1437840"/>
           </a:xfrm>
           <a:prstGeom prst="rect">
             <a:avLst/>
@@ -11743,7 +11884,7 @@
         <p:spPr>
           <a:xfrm>
             <a:off x="6840000" y="2520000"/>
-            <a:ext cx="1798200" cy="1438200"/>
+            <a:ext cx="1797840" cy="1437840"/>
           </a:xfrm>
           <a:prstGeom prst="rect">
             <a:avLst/>
@@ -11801,7 +11942,7 @@
         <p:spPr>
           <a:xfrm>
             <a:off x="5040000" y="2700000"/>
-            <a:ext cx="1438200" cy="358200"/>
+            <a:ext cx="1437840" cy="357840"/>
           </a:xfrm>
           <a:prstGeom prst="rect">
             <a:avLst/>
@@ -11859,7 +12000,7 @@
         <p:spPr>
           <a:xfrm>
             <a:off x="652680" y="2160000"/>
-            <a:ext cx="2225520" cy="1978200"/>
+            <a:ext cx="2225160" cy="1977840"/>
           </a:xfrm>
           <a:prstGeom prst="ellipse">
             <a:avLst/>
@@ -11917,7 +12058,7 @@
         <p:spPr>
           <a:xfrm>
             <a:off x="3420000" y="2700000"/>
-            <a:ext cx="1078200" cy="178200"/>
+            <a:ext cx="1077840" cy="177840"/>
           </a:xfrm>
           <a:prstGeom prst="rightArrow">
             <a:avLst>
@@ -11945,11 +12086,17 @@
             <a:noAutofit/>
           </a:bodyPr>
           <a:p>
+            <a:pPr>
+              <a:lnSpc>
+                <a:spcPct val="100000"/>
+              </a:lnSpc>
+            </a:pPr>
             <a:endParaRPr b="0" lang="cs-CZ" sz="1800" spc="-1" strike="noStrike">
               <a:solidFill>
                 <a:srgbClr val="ffffff"/>
               </a:solidFill>
               <a:latin typeface="Arial"/>
+              <a:ea typeface="DejaVu Sans"/>
             </a:endParaRPr>
           </a:p>
         </p:txBody>
@@ -11963,7 +12110,7 @@
         <p:spPr>
           <a:xfrm>
             <a:off x="3420000" y="3600000"/>
-            <a:ext cx="1078200" cy="178200"/>
+            <a:ext cx="1077840" cy="177840"/>
           </a:xfrm>
           <a:prstGeom prst="leftArrow">
             <a:avLst>
@@ -11991,11 +12138,17 @@
             <a:noAutofit/>
           </a:bodyPr>
           <a:p>
+            <a:pPr>
+              <a:lnSpc>
+                <a:spcPct val="100000"/>
+              </a:lnSpc>
+            </a:pPr>
             <a:endParaRPr b="0" lang="cs-CZ" sz="1800" spc="-1" strike="noStrike">
               <a:solidFill>
                 <a:srgbClr val="ffffff"/>
               </a:solidFill>
               <a:latin typeface="Arial"/>
+              <a:ea typeface="DejaVu Sans"/>
             </a:endParaRPr>
           </a:p>
         </p:txBody>
@@ -12012,8 +12165,8 @@
         </p:blipFill>
         <p:spPr>
           <a:xfrm flipH="1">
-            <a:off x="1620360" y="3420000"/>
-            <a:ext cx="359640" cy="359640"/>
+            <a:off x="1620720" y="3420000"/>
+            <a:ext cx="359280" cy="359280"/>
           </a:xfrm>
           <a:prstGeom prst="rect">
             <a:avLst/>
@@ -12036,7 +12189,7 @@
         <p:spPr>
           <a:xfrm>
             <a:off x="2160000" y="3420000"/>
-            <a:ext cx="358200" cy="358200"/>
+            <a:ext cx="357840" cy="357840"/>
           </a:xfrm>
           <a:prstGeom prst="rect">
             <a:avLst/>
@@ -12059,7 +12212,7 @@
         <p:spPr>
           <a:xfrm>
             <a:off x="1080000" y="3420000"/>
-            <a:ext cx="358200" cy="358200"/>
+            <a:ext cx="357840" cy="357840"/>
           </a:xfrm>
           <a:prstGeom prst="rect">
             <a:avLst/>
@@ -12082,7 +12235,7 @@
         <p:spPr>
           <a:xfrm>
             <a:off x="7020000" y="3420000"/>
-            <a:ext cx="358200" cy="358200"/>
+            <a:ext cx="357840" cy="357840"/>
           </a:xfrm>
           <a:prstGeom prst="rect">
             <a:avLst/>
@@ -12105,7 +12258,7 @@
         <p:spPr>
           <a:xfrm>
             <a:off x="8100000" y="3420000"/>
-            <a:ext cx="358200" cy="358200"/>
+            <a:ext cx="357840" cy="357840"/>
           </a:xfrm>
           <a:prstGeom prst="rect">
             <a:avLst/>
@@ -12128,7 +12281,7 @@
         <p:spPr>
           <a:xfrm>
             <a:off x="7560000" y="3420000"/>
-            <a:ext cx="358200" cy="358200"/>
+            <a:ext cx="357840" cy="357840"/>
           </a:xfrm>
           <a:prstGeom prst="rect">
             <a:avLst/>
@@ -12151,7 +12304,7 @@
         <p:spPr>
           <a:xfrm>
             <a:off x="5220000" y="3420000"/>
-            <a:ext cx="358200" cy="358200"/>
+            <a:ext cx="357840" cy="357840"/>
           </a:xfrm>
           <a:prstGeom prst="rect">
             <a:avLst/>
@@ -12174,7 +12327,7 @@
         <p:spPr>
           <a:xfrm>
             <a:off x="5940000" y="3420000"/>
-            <a:ext cx="358200" cy="358200"/>
+            <a:ext cx="357840" cy="357840"/>
           </a:xfrm>
           <a:prstGeom prst="rect">
             <a:avLst/>
@@ -12235,7 +12388,7 @@
         <p:spPr>
           <a:xfrm>
             <a:off x="450000" y="270000"/>
-            <a:ext cx="8997480" cy="3237480"/>
+            <a:ext cx="8997120" cy="3237120"/>
           </a:xfrm>
           <a:prstGeom prst="rect">
             <a:avLst/>
@@ -12328,7 +12481,7 @@
         <p:spPr>
           <a:xfrm>
             <a:off x="502920" y="90720"/>
-            <a:ext cx="9069120" cy="944280"/>
+            <a:ext cx="9068760" cy="943920"/>
           </a:xfrm>
           <a:prstGeom prst="rect">
             <a:avLst/>
@@ -12379,7 +12532,7 @@
         <p:spPr>
           <a:xfrm>
             <a:off x="540000" y="2520000"/>
-            <a:ext cx="5579280" cy="359280"/>
+            <a:ext cx="5578920" cy="358920"/>
           </a:xfrm>
           <a:prstGeom prst="rect">
             <a:avLst/>
@@ -12435,7 +12588,7 @@
         <p:spPr>
           <a:xfrm>
             <a:off x="532800" y="3060000"/>
-            <a:ext cx="5586480" cy="657000"/>
+            <a:ext cx="5586120" cy="656640"/>
           </a:xfrm>
           <a:prstGeom prst="rect">
             <a:avLst/>
@@ -12600,7 +12753,7 @@
         <p:spPr>
           <a:xfrm>
             <a:off x="540000" y="3837960"/>
-            <a:ext cx="5579280" cy="301320"/>
+            <a:ext cx="5578920" cy="300960"/>
           </a:xfrm>
           <a:prstGeom prst="rect">
             <a:avLst/>

</xml_diff>